<commit_message>
Fixed missing title in the last slide
</commit_message>
<xml_diff>
--- a/presentation/Pattern Extraction2.pptx
+++ b/presentation/Pattern Extraction2.pptx
@@ -1818,7 +1818,7 @@
           <a:p>
             <a:fld id="{EBACBB57-5019-4C34-B895-9DAC8A1F72A5}" type="datetimeFigureOut">
               <a:rPr lang="fr-CH" smtClean="0"/>
-              <a:t>27.03.2020</a:t>
+              <a:t>31.03.2020</a:t>
             </a:fld>
             <a:endParaRPr lang="fr-CH"/>
           </a:p>
@@ -2504,7 +2504,7 @@
           <a:p>
             <a:fld id="{A1C5EC13-83CD-46FC-A749-A66713452AB8}" type="datetime1">
               <a:rPr lang="fr-CH" smtClean="0"/>
-              <a:t>27.03.2020</a:t>
+              <a:t>31.03.2020</a:t>
             </a:fld>
             <a:endParaRPr lang="fr-CH"/>
           </a:p>
@@ -2691,7 +2691,7 @@
           <a:p>
             <a:fld id="{7E456747-9D74-4D5C-A57B-216C1DCF555B}" type="datetime1">
               <a:rPr lang="fr-CH" smtClean="0"/>
-              <a:t>27.03.2020</a:t>
+              <a:t>31.03.2020</a:t>
             </a:fld>
             <a:endParaRPr lang="fr-CH"/>
           </a:p>
@@ -2871,7 +2871,7 @@
           <a:p>
             <a:fld id="{35AB7460-04F9-4582-9AE7-9E23C393B231}" type="datetime1">
               <a:rPr lang="fr-CH" smtClean="0"/>
-              <a:t>27.03.2020</a:t>
+              <a:t>31.03.2020</a:t>
             </a:fld>
             <a:endParaRPr lang="fr-CH"/>
           </a:p>
@@ -3056,7 +3056,7 @@
           <a:p>
             <a:fld id="{443BA57E-7B21-4F6F-82E1-FF01CD7ABA13}" type="datetime1">
               <a:rPr lang="fr-CH" smtClean="0"/>
-              <a:t>27.03.2020</a:t>
+              <a:t>31.03.2020</a:t>
             </a:fld>
             <a:endParaRPr lang="en-US" dirty="0"/>
           </a:p>
@@ -3874,7 +3874,7 @@
           <a:p>
             <a:fld id="{062309E3-34CC-4F3C-A1BD-713587317DF7}" type="datetime1">
               <a:rPr lang="fr-CH" smtClean="0"/>
-              <a:t>27.03.2020</a:t>
+              <a:t>31.03.2020</a:t>
             </a:fld>
             <a:endParaRPr lang="fr-CH"/>
           </a:p>
@@ -4056,7 +4056,7 @@
           <a:p>
             <a:fld id="{CA50544D-CD99-4DB3-9168-B3A8E20C09FE}" type="datetime1">
               <a:rPr lang="fr-CH" smtClean="0"/>
-              <a:t>27.03.2020</a:t>
+              <a:t>31.03.2020</a:t>
             </a:fld>
             <a:endParaRPr lang="fr-CH"/>
           </a:p>
@@ -4310,7 +4310,7 @@
           <a:p>
             <a:fld id="{0BA05AE5-1ED1-49B1-BD0C-362DD8300DA6}" type="datetime1">
               <a:rPr lang="fr-CH" smtClean="0"/>
-              <a:t>27.03.2020</a:t>
+              <a:t>31.03.2020</a:t>
             </a:fld>
             <a:endParaRPr lang="fr-CH"/>
           </a:p>
@@ -4549,7 +4549,7 @@
           <a:p>
             <a:fld id="{F321FB04-B1F8-410C-91A1-6F9F06ABF9AD}" type="datetime1">
               <a:rPr lang="fr-CH" smtClean="0"/>
-              <a:t>27.03.2020</a:t>
+              <a:t>31.03.2020</a:t>
             </a:fld>
             <a:endParaRPr lang="fr-CH"/>
           </a:p>
@@ -4923,7 +4923,7 @@
           <a:p>
             <a:fld id="{B78CB868-B46E-4481-9B17-F23B1E033C87}" type="datetime1">
               <a:rPr lang="fr-CH" smtClean="0"/>
-              <a:t>27.03.2020</a:t>
+              <a:t>31.03.2020</a:t>
             </a:fld>
             <a:endParaRPr lang="fr-CH"/>
           </a:p>
@@ -5046,7 +5046,7 @@
           <a:p>
             <a:fld id="{AED0E9EF-17A4-4D73-89B5-BE4B97634EE6}" type="datetime1">
               <a:rPr lang="fr-CH" smtClean="0"/>
-              <a:t>27.03.2020</a:t>
+              <a:t>31.03.2020</a:t>
             </a:fld>
             <a:endParaRPr lang="fr-CH"/>
           </a:p>
@@ -5141,7 +5141,7 @@
           <a:p>
             <a:fld id="{185805BF-25D7-407C-8F23-26F91DDF1D3E}" type="datetime1">
               <a:rPr lang="fr-CH" smtClean="0"/>
-              <a:t>27.03.2020</a:t>
+              <a:t>31.03.2020</a:t>
             </a:fld>
             <a:endParaRPr lang="fr-CH"/>
           </a:p>
@@ -5411,7 +5411,7 @@
           <a:p>
             <a:fld id="{159142C7-4527-4223-B0C3-EFB260406640}" type="datetime1">
               <a:rPr lang="fr-CH" smtClean="0"/>
-              <a:t>27.03.2020</a:t>
+              <a:t>31.03.2020</a:t>
             </a:fld>
             <a:endParaRPr lang="fr-CH"/>
           </a:p>
@@ -5683,7 +5683,7 @@
           <a:p>
             <a:fld id="{76BB6D0E-3881-4B3D-96CD-ECBF10879B6D}" type="datetime1">
               <a:rPr lang="fr-CH" smtClean="0"/>
-              <a:t>27.03.2020</a:t>
+              <a:t>31.03.2020</a:t>
             </a:fld>
             <a:endParaRPr lang="fr-CH"/>
           </a:p>
@@ -5988,7 +5988,7 @@
           <a:p>
             <a:fld id="{CE03783F-3525-484F-BB92-A97332512ECC}" type="datetime1">
               <a:rPr lang="fr-CH" smtClean="0"/>
-              <a:t>27.03.2020</a:t>
+              <a:t>31.03.2020</a:t>
             </a:fld>
             <a:endParaRPr lang="fr-CH"/>
           </a:p>
@@ -6197,7 +6197,7 @@
           <a:p>
             <a:fld id="{3DD17AEC-70AF-45C1-A4D8-B9682E9F5690}" type="datetime1">
               <a:rPr lang="fr-CH" smtClean="0"/>
-              <a:t>27.03.2020</a:t>
+              <a:t>31.03.2020</a:t>
             </a:fld>
             <a:endParaRPr lang="fr-CH"/>
           </a:p>
@@ -6511,7 +6511,7 @@
           <a:p>
             <a:fld id="{DD598F42-9E37-44B5-9404-FFDB7BFA3C58}" type="datetime1">
               <a:rPr lang="fr-CH" smtClean="0"/>
-              <a:t>27.03.2020</a:t>
+              <a:t>31.03.2020</a:t>
             </a:fld>
             <a:endParaRPr lang="fr-CH"/>
           </a:p>
@@ -6844,7 +6844,7 @@
           <a:p>
             <a:fld id="{D80A43B4-503F-48B3-9D69-A1E033EB31DC}" type="datetime1">
               <a:rPr lang="fr-CH" smtClean="0"/>
-              <a:t>27.03.2020</a:t>
+              <a:t>31.03.2020</a:t>
             </a:fld>
             <a:endParaRPr lang="fr-CH"/>
           </a:p>
@@ -7158,7 +7158,7 @@
           <a:p>
             <a:fld id="{C63570D4-DC05-4346-960C-EE641E3F13E6}" type="datetime1">
               <a:rPr lang="fr-CH" smtClean="0"/>
-              <a:t>27.03.2020</a:t>
+              <a:t>31.03.2020</a:t>
             </a:fld>
             <a:endParaRPr lang="fr-CH"/>
           </a:p>
@@ -7551,7 +7551,7 @@
           <a:p>
             <a:fld id="{6DAD8BB9-B4F7-4387-B4ED-AABAD1F880A7}" type="datetime1">
               <a:rPr lang="fr-CH" smtClean="0"/>
-              <a:t>27.03.2020</a:t>
+              <a:t>31.03.2020</a:t>
             </a:fld>
             <a:endParaRPr lang="fr-CH"/>
           </a:p>
@@ -7721,7 +7721,7 @@
           <a:p>
             <a:fld id="{5AECCC42-73C7-497A-91BC-5B46DEBB8AEF}" type="datetime1">
               <a:rPr lang="fr-CH" smtClean="0"/>
-              <a:t>27.03.2020</a:t>
+              <a:t>31.03.2020</a:t>
             </a:fld>
             <a:endParaRPr lang="fr-CH"/>
           </a:p>
@@ -7901,7 +7901,7 @@
           <a:p>
             <a:fld id="{24A8B8C1-AC7C-4439-ABE1-977A3F495DB0}" type="datetime1">
               <a:rPr lang="fr-CH" smtClean="0"/>
-              <a:t>27.03.2020</a:t>
+              <a:t>31.03.2020</a:t>
             </a:fld>
             <a:endParaRPr lang="fr-CH"/>
           </a:p>
@@ -8147,7 +8147,7 @@
           <a:p>
             <a:fld id="{8A489873-EBA8-4E74-A188-36791492334D}" type="datetime1">
               <a:rPr lang="fr-CH" smtClean="0"/>
-              <a:t>27.03.2020</a:t>
+              <a:t>31.03.2020</a:t>
             </a:fld>
             <a:endParaRPr lang="fr-CH"/>
           </a:p>
@@ -8386,7 +8386,7 @@
           <a:p>
             <a:fld id="{2716B30A-CC25-498D-A978-F9C8FA3447EC}" type="datetime1">
               <a:rPr lang="fr-CH" smtClean="0"/>
-              <a:t>27.03.2020</a:t>
+              <a:t>31.03.2020</a:t>
             </a:fld>
             <a:endParaRPr lang="fr-CH"/>
           </a:p>
@@ -8760,7 +8760,7 @@
           <a:p>
             <a:fld id="{86F0612F-4B27-4C50-9FEF-D899F02BE98F}" type="datetime1">
               <a:rPr lang="fr-CH" smtClean="0"/>
-              <a:t>27.03.2020</a:t>
+              <a:t>31.03.2020</a:t>
             </a:fld>
             <a:endParaRPr lang="fr-CH"/>
           </a:p>
@@ -8885,7 +8885,7 @@
           <a:p>
             <a:fld id="{1F3DD3EA-FE5E-4B40-AAF2-7BDC6B236448}" type="datetime1">
               <a:rPr lang="fr-CH" smtClean="0"/>
-              <a:t>27.03.2020</a:t>
+              <a:t>31.03.2020</a:t>
             </a:fld>
             <a:endParaRPr lang="fr-CH"/>
           </a:p>
@@ -8980,7 +8980,7 @@
           <a:p>
             <a:fld id="{DFCE601C-520E-4D95-87EA-C15A6C947E77}" type="datetime1">
               <a:rPr lang="fr-CH" smtClean="0"/>
-              <a:t>27.03.2020</a:t>
+              <a:t>31.03.2020</a:t>
             </a:fld>
             <a:endParaRPr lang="fr-CH"/>
           </a:p>
@@ -9257,7 +9257,7 @@
           <a:p>
             <a:fld id="{7CDD90FB-8902-44F1-AFF3-670F9F6ABDF8}" type="datetime1">
               <a:rPr lang="fr-CH" smtClean="0"/>
-              <a:t>27.03.2020</a:t>
+              <a:t>31.03.2020</a:t>
             </a:fld>
             <a:endParaRPr lang="fr-CH"/>
           </a:p>
@@ -9510,7 +9510,7 @@
           <a:p>
             <a:fld id="{6A97B839-6A40-4321-AA7D-D18AFAC76C0E}" type="datetime1">
               <a:rPr lang="fr-CH" smtClean="0"/>
-              <a:t>27.03.2020</a:t>
+              <a:t>31.03.2020</a:t>
             </a:fld>
             <a:endParaRPr lang="fr-CH"/>
           </a:p>
@@ -9723,7 +9723,7 @@
           <a:p>
             <a:fld id="{36C5D13F-9125-4315-B7A7-EB82236C947E}" type="datetime1">
               <a:rPr lang="fr-CH" smtClean="0"/>
-              <a:t>27.03.2020</a:t>
+              <a:t>31.03.2020</a:t>
             </a:fld>
             <a:endParaRPr lang="fr-CH"/>
           </a:p>
@@ -10804,7 +10804,7 @@
           <a:p>
             <a:fld id="{35BA6938-53D0-4653-82AB-3885BCA89A92}" type="datetime1">
               <a:rPr lang="fr-CH" smtClean="0"/>
-              <a:t>27.03.2020</a:t>
+              <a:t>31.03.2020</a:t>
             </a:fld>
             <a:endParaRPr lang="fr-CH"/>
           </a:p>
@@ -11361,7 +11361,6 @@
               <a:rPr lang="fr-CH" sz="4000" dirty="0"/>
               <a:t>Pattern Extraction</a:t>
             </a:r>
-            <a:endParaRPr lang="fr-CH" sz="4000" dirty="0"/>
           </a:p>
         </p:txBody>
       </p:sp>
@@ -11384,7 +11383,6 @@
               <a:rPr lang="fr-CH" dirty="0"/>
               <a:t>Stauffer Guy-Raphaël and Chevalley Gibran</a:t>
             </a:r>
-            <a:endParaRPr lang="fr-CH" dirty="0"/>
           </a:p>
         </p:txBody>
       </p:sp>
@@ -12837,7 +12835,11 @@
           <a:bodyPr/>
           <a:lstStyle/>
           <a:p>
-            <a:endParaRPr lang="fr-CH"/>
+            <a:r>
+              <a:rPr lang="fr-CH" dirty="0" smtClean="0"/>
+              <a:t>Sources</a:t>
+            </a:r>
+            <a:endParaRPr lang="fr-CH" dirty="0"/>
           </a:p>
         </p:txBody>
       </p:sp>

</xml_diff>